<commit_message>
Added presentation & updated poster
</commit_message>
<xml_diff>
--- a/Poster_short.pptx
+++ b/Poster_short.pptx
@@ -143,7 +143,7 @@
   <p:extLst>
     <p:ext uri="{EFAFB233-063F-42B5-8137-9DF3F51BA10A}">
       <p15:sldGuideLst xmlns:p15="http://schemas.microsoft.com/office/powerpoint/2012/main">
-        <p15:guide id="1" orient="horz" pos="13481">
+        <p15:guide id="1" orient="horz" pos="13527" userDrawn="1">
           <p15:clr>
             <a:srgbClr val="A4A3A4"/>
           </p15:clr>
@@ -249,7 +249,7 @@
           <a:p>
             <a:fld id="{8F950391-AC0C-4407-BF6D-23CF3BE463FD}" type="datetimeFigureOut">
               <a:rPr lang="de-DE" smtClean="0"/>
-              <a:t>27.04.2017</a:t>
+              <a:t>28.04.17</a:t>
             </a:fld>
             <a:endParaRPr lang="de-DE"/>
           </a:p>
@@ -414,7 +414,7 @@
           <a:p>
             <a:fld id="{A58DD16A-45E6-4788-97A3-AFA1ADFE966D}" type="datetimeFigureOut">
               <a:rPr lang="en-US"/>
-              <a:t>4/27/2017</a:t>
+              <a:t>4/28/17</a:t>
             </a:fld>
             <a:endParaRPr lang="en-US"/>
           </a:p>
@@ -1249,7 +1249,7 @@
               <a:pPr>
                 <a:defRPr/>
               </a:pPr>
-              <a:t>27.04.2017</a:t>
+              <a:t>28.04.17</a:t>
             </a:fld>
             <a:endParaRPr lang="en-US" altLang="de-DE"/>
           </a:p>
@@ -1446,7 +1446,7 @@
               <a:pPr>
                 <a:defRPr/>
               </a:pPr>
-              <a:t>27.04.2017</a:t>
+              <a:t>28.04.17</a:t>
             </a:fld>
             <a:endParaRPr lang="en-US" altLang="de-DE"/>
           </a:p>
@@ -1653,7 +1653,7 @@
               <a:pPr>
                 <a:defRPr/>
               </a:pPr>
-              <a:t>27.04.2017</a:t>
+              <a:t>28.04.17</a:t>
             </a:fld>
             <a:endParaRPr lang="en-US" altLang="de-DE"/>
           </a:p>
@@ -1850,7 +1850,7 @@
               <a:pPr>
                 <a:defRPr/>
               </a:pPr>
-              <a:t>27.04.2017</a:t>
+              <a:t>28.04.17</a:t>
             </a:fld>
             <a:endParaRPr lang="en-US" altLang="de-DE"/>
           </a:p>
@@ -2123,7 +2123,7 @@
               <a:pPr>
                 <a:defRPr/>
               </a:pPr>
-              <a:t>27.04.2017</a:t>
+              <a:t>28.04.17</a:t>
             </a:fld>
             <a:endParaRPr lang="en-US" altLang="de-DE"/>
           </a:p>
@@ -2438,7 +2438,7 @@
               <a:pPr>
                 <a:defRPr/>
               </a:pPr>
-              <a:t>27.04.2017</a:t>
+              <a:t>28.04.17</a:t>
             </a:fld>
             <a:endParaRPr lang="en-US" altLang="de-DE"/>
           </a:p>
@@ -2892,7 +2892,7 @@
               <a:pPr>
                 <a:defRPr/>
               </a:pPr>
-              <a:t>27.04.2017</a:t>
+              <a:t>28.04.17</a:t>
             </a:fld>
             <a:endParaRPr lang="en-US" altLang="de-DE"/>
           </a:p>
@@ -3037,7 +3037,7 @@
               <a:pPr>
                 <a:defRPr/>
               </a:pPr>
-              <a:t>27.04.2017</a:t>
+              <a:t>28.04.17</a:t>
             </a:fld>
             <a:endParaRPr lang="en-US" altLang="de-DE"/>
           </a:p>
@@ -3159,7 +3159,7 @@
               <a:pPr>
                 <a:defRPr/>
               </a:pPr>
-              <a:t>27.04.2017</a:t>
+              <a:t>28.04.17</a:t>
             </a:fld>
             <a:endParaRPr lang="en-US" altLang="de-DE"/>
           </a:p>
@@ -3463,7 +3463,7 @@
               <a:pPr>
                 <a:defRPr/>
               </a:pPr>
-              <a:t>27.04.2017</a:t>
+              <a:t>28.04.17</a:t>
             </a:fld>
             <a:endParaRPr lang="en-US" altLang="de-DE"/>
           </a:p>
@@ -3746,7 +3746,7 @@
               <a:pPr>
                 <a:defRPr/>
               </a:pPr>
-              <a:t>27.04.2017</a:t>
+              <a:t>28.04.17</a:t>
             </a:fld>
             <a:endParaRPr lang="en-US" altLang="de-DE"/>
           </a:p>
@@ -4037,7 +4037,7 @@
               <a:pPr>
                 <a:defRPr/>
               </a:pPr>
-              <a:t>27.04.2017</a:t>
+              <a:t>28.04.17</a:t>
             </a:fld>
             <a:endParaRPr lang="en-US" altLang="de-DE"/>
           </a:p>
@@ -5053,7 +5053,7 @@
         </p:nvSpPr>
         <p:spPr>
           <a:xfrm>
-            <a:off x="5412159" y="8800481"/>
+            <a:off x="5412159" y="8515087"/>
             <a:ext cx="19734559" cy="1107996"/>
           </a:xfrm>
           <a:prstGeom prst="rect">
@@ -5256,8 +5256,8 @@
         </p:nvSpPr>
         <p:spPr>
           <a:xfrm>
-            <a:off x="371619" y="12976898"/>
-            <a:ext cx="6678535" cy="2092881"/>
+            <a:off x="5684865" y="9948719"/>
+            <a:ext cx="7023160" cy="2677656"/>
           </a:xfrm>
           <a:prstGeom prst="rect">
             <a:avLst/>
@@ -5270,31 +5270,62 @@
           </a:bodyPr>
           <a:lstStyle/>
           <a:p>
-            <a:pPr algn="just"/>
-            <a:r>
-              <a:rPr lang="en-GB" sz="1800" dirty="0"/>
-              <a:t>In February of 2012, the ONT (Oxford Nanopore Technologies) launched a new device with the size of a USB memory stick. This device should be the future of DNA sequencing, the so-called </a:t>
-            </a:r>
-            <a:r>
-              <a:rPr lang="en-GB" sz="1800" dirty="0" err="1"/>
-              <a:t>MinION</a:t>
-            </a:r>
-            <a:r>
-              <a:rPr lang="en-GB" sz="1800" dirty="0"/>
-              <a:t>. Through low cost, portability and quickness, </a:t>
-            </a:r>
-            <a:r>
-              <a:rPr lang="en-GB" sz="1800" dirty="0" err="1"/>
-              <a:t>MinION</a:t>
-            </a:r>
-            <a:r>
-              <a:rPr lang="en-GB" sz="1800" dirty="0"/>
-              <a:t> should make sequencing universally accessible. </a:t>
-            </a:r>
-            <a:endParaRPr lang="de-DE" sz="1800" dirty="0"/>
-          </a:p>
-          <a:p>
-            <a:endParaRPr lang="de-DE" sz="4000" dirty="0"/>
+            <a:pPr marL="285750" indent="-285750" algn="just">
+              <a:buFontTx/>
+              <a:buChar char="-"/>
+            </a:pPr>
+            <a:r>
+              <a:rPr lang="en-GB" sz="2400" dirty="0" smtClean="0"/>
+              <a:t>Introduced Feb 2012 by Oxford </a:t>
+            </a:r>
+            <a:r>
+              <a:rPr lang="en-GB" sz="2400" dirty="0" err="1" smtClean="0"/>
+              <a:t>Nanopore</a:t>
+            </a:r>
+            <a:r>
+              <a:rPr lang="en-GB" sz="2400" dirty="0" smtClean="0"/>
+              <a:t> Technology (ONT)</a:t>
+            </a:r>
+          </a:p>
+          <a:p>
+            <a:pPr marL="285750" indent="-285750" algn="just">
+              <a:buFontTx/>
+              <a:buChar char="-"/>
+            </a:pPr>
+            <a:r>
+              <a:rPr lang="en-GB" sz="2400" dirty="0" smtClean="0"/>
+              <a:t>Real-time DNA, RNA / miRNA and Protein Sequencing</a:t>
+            </a:r>
+          </a:p>
+          <a:p>
+            <a:pPr marL="285750" indent="-285750" algn="just">
+              <a:buFontTx/>
+              <a:buChar char="-"/>
+            </a:pPr>
+            <a:r>
+              <a:rPr lang="en-GB" sz="2400" dirty="0" smtClean="0"/>
+              <a:t>Compact USB-Stick Format</a:t>
+            </a:r>
+          </a:p>
+          <a:p>
+            <a:pPr marL="285750" indent="-285750" algn="just">
+              <a:buFontTx/>
+              <a:buChar char="-"/>
+            </a:pPr>
+            <a:r>
+              <a:rPr lang="en-GB" sz="2400" dirty="0" smtClean="0"/>
+              <a:t>Low cost</a:t>
+            </a:r>
+          </a:p>
+          <a:p>
+            <a:pPr marL="285750" indent="-285750" algn="just">
+              <a:buFontTx/>
+              <a:buChar char="-"/>
+            </a:pPr>
+            <a:r>
+              <a:rPr lang="en-GB" sz="2400" dirty="0" smtClean="0"/>
+              <a:t>Fast library preparation</a:t>
+            </a:r>
           </a:p>
         </p:txBody>
       </p:sp>
@@ -5306,8 +5337,8 @@
         </p:nvSpPr>
         <p:spPr>
           <a:xfrm>
-            <a:off x="330429" y="10633315"/>
-            <a:ext cx="6311891" cy="2708434"/>
+            <a:off x="5733468" y="15983669"/>
+            <a:ext cx="7470743" cy="2739211"/>
           </a:xfrm>
           <a:prstGeom prst="rect">
             <a:avLst/>
@@ -5320,30 +5351,95 @@
           </a:bodyPr>
           <a:lstStyle/>
           <a:p>
-            <a:pPr algn="just"/>
-            <a:r>
-              <a:rPr lang="en-GB" sz="1800" dirty="0"/>
-              <a:t>Each molecule of DNA is double stranded, one end contains a loading adaptor and the second one a hairpin adaptor. Firstly, one strand of DNA (called template) is passed through the pore, followed by the hairpin adaptor and then by the second strand (called complement). Then, the information from both strands is used for </a:t>
-            </a:r>
-            <a:r>
-              <a:rPr lang="en-GB" sz="1800" dirty="0" smtClean="0"/>
+            <a:pPr marL="285750" indent="-285750" algn="just">
+              <a:buFontTx/>
+              <a:buChar char="-"/>
+            </a:pPr>
+            <a:r>
+              <a:rPr lang="en-GB" sz="2400" dirty="0" smtClean="0"/>
+              <a:t>A passing molecule is composed of</a:t>
+            </a:r>
+          </a:p>
+          <a:p>
+            <a:pPr marL="2373313" lvl="1" indent="-285750" algn="just">
+              <a:buFontTx/>
+              <a:buChar char="-"/>
+            </a:pPr>
+            <a:r>
+              <a:rPr lang="en-GB" sz="2000" dirty="0" smtClean="0"/>
+              <a:t>Loading adaptor (Eases flow through pore)</a:t>
+            </a:r>
+          </a:p>
+          <a:p>
+            <a:pPr marL="2373313" lvl="1" indent="-285750" algn="just">
+              <a:buFontTx/>
+              <a:buChar char="-"/>
+            </a:pPr>
+            <a:r>
+              <a:rPr lang="en-GB" sz="2000" dirty="0" smtClean="0"/>
+              <a:t>Template strand</a:t>
+            </a:r>
+          </a:p>
+          <a:p>
+            <a:pPr marL="2373313" lvl="1" indent="-285750" algn="just">
+              <a:buFontTx/>
+              <a:buChar char="-"/>
+            </a:pPr>
+            <a:r>
+              <a:rPr lang="en-GB" sz="2000" dirty="0" smtClean="0"/>
+              <a:t>Hairpin adaptor (Connects strands)</a:t>
+            </a:r>
+          </a:p>
+          <a:p>
+            <a:pPr marL="2373313" lvl="1" indent="-285750" algn="just">
+              <a:buFontTx/>
+              <a:buChar char="-"/>
+            </a:pPr>
+            <a:r>
+              <a:rPr lang="en-GB" sz="2000" dirty="0" smtClean="0"/>
+              <a:t>Complement strand</a:t>
+            </a:r>
+          </a:p>
+          <a:p>
+            <a:pPr marL="2373313" lvl="1" indent="-285750" algn="just">
+              <a:buFontTx/>
+              <a:buChar char="-"/>
+            </a:pPr>
+            <a:r>
+              <a:rPr lang="en-GB" sz="2000" dirty="0" smtClean="0"/>
+              <a:t>Loading adaptor </a:t>
+            </a:r>
+          </a:p>
+          <a:p>
+            <a:pPr marL="285750" indent="-285750" algn="just">
+              <a:buFontTx/>
+              <a:buChar char="-"/>
+            </a:pPr>
+            <a:r>
+              <a:rPr lang="en-GB" sz="2400" dirty="0"/>
+              <a:t>T</a:t>
+            </a:r>
+            <a:r>
+              <a:rPr lang="en-GB" sz="2400" dirty="0" smtClean="0"/>
+              <a:t>he </a:t>
+            </a:r>
+            <a:r>
+              <a:rPr lang="en-GB" sz="2400" dirty="0"/>
+              <a:t>information from both strands is used for </a:t>
+            </a:r>
+            <a:r>
+              <a:rPr lang="en-GB" sz="2400" dirty="0" smtClean="0"/>
               <a:t>the consensus </a:t>
             </a:r>
             <a:r>
-              <a:rPr lang="en-GB" sz="1800" dirty="0"/>
+              <a:rPr lang="en-GB" sz="2400" dirty="0"/>
               <a:t>sequence (2D read</a:t>
             </a:r>
             <a:r>
-              <a:rPr lang="en-GB" sz="1800" dirty="0" smtClean="0"/>
-              <a:t>).</a:t>
-            </a:r>
-            <a:endParaRPr lang="en-GB" sz="1800" dirty="0"/>
-          </a:p>
-          <a:p>
+              <a:rPr lang="en-GB" sz="2400" dirty="0" smtClean="0"/>
+              <a:t>)</a:t>
+            </a:r>
             <a:endParaRPr lang="de-DE" sz="2000" dirty="0"/>
-          </a:p>
-          <a:p>
-            <a:endParaRPr lang="de-DE" sz="2400" dirty="0"/>
           </a:p>
         </p:txBody>
       </p:sp>
@@ -5363,8 +5459,8 @@
         </p:blipFill>
         <p:spPr>
           <a:xfrm>
-            <a:off x="525672" y="7734221"/>
-            <a:ext cx="5530144" cy="2754074"/>
+            <a:off x="818928" y="15983669"/>
+            <a:ext cx="4593231" cy="2475647"/>
           </a:xfrm>
           <a:prstGeom prst="rect">
             <a:avLst/>
@@ -5373,7 +5469,7 @@
       </p:pic>
       <p:pic>
         <p:nvPicPr>
-          <p:cNvPr id="1026" name="Picture 2" descr="https://scontent-fra3-1.xx.fbcdn.net/v/t34.0-12/18072412_10210562571715551_590672232_n.png?oh=31919c46f5c80e54866eadc58eae2656&amp;oe=58FDC039"/>
+          <p:cNvPr id="1032" name="Picture 8" descr="Risultati immagini per minion ont"/>
           <p:cNvPicPr>
             <a:picLocks noChangeAspect="1" noChangeArrowheads="1"/>
           </p:cNvPicPr>
@@ -5394,8 +5490,8 @@
         </p:blipFill>
         <p:spPr bwMode="auto">
           <a:xfrm>
-            <a:off x="24088259" y="22868741"/>
-            <a:ext cx="2106958" cy="1801888"/>
+            <a:off x="818927" y="9929101"/>
+            <a:ext cx="4421727" cy="2697274"/>
           </a:xfrm>
           <a:prstGeom prst="rect">
             <a:avLst/>
@@ -5412,47 +5508,6 @@
           </a:extLst>
         </p:spPr>
       </p:pic>
-      <p:pic>
-        <p:nvPicPr>
-          <p:cNvPr id="1032" name="Picture 8" descr="Risultati immagini per minion ont"/>
-          <p:cNvPicPr>
-            <a:picLocks noChangeAspect="1" noChangeArrowheads="1"/>
-          </p:cNvPicPr>
-          <p:nvPr/>
-        </p:nvPicPr>
-        <p:blipFill>
-          <a:blip r:embed="rId6">
-            <a:extLst>
-              <a:ext uri="{28A0092B-C50C-407E-A947-70E740481C1C}">
-                <a14:useLocalDpi xmlns:a14="http://schemas.microsoft.com/office/drawing/2010/main" val="0"/>
-              </a:ext>
-            </a:extLst>
-          </a:blip>
-          <a:srcRect/>
-          <a:stretch>
-            <a:fillRect/>
-          </a:stretch>
-        </p:blipFill>
-        <p:spPr bwMode="auto">
-          <a:xfrm>
-            <a:off x="1978715" y="10369960"/>
-            <a:ext cx="3729223" cy="2488092"/>
-          </a:xfrm>
-          <a:prstGeom prst="rect">
-            <a:avLst/>
-          </a:prstGeom>
-          <a:noFill/>
-          <a:extLst>
-            <a:ext uri="{909E8E84-426E-40DD-AFC4-6F175D3DCCD1}">
-              <a14:hiddenFill xmlns:a14="http://schemas.microsoft.com/office/drawing/2010/main">
-                <a:solidFill>
-                  <a:srgbClr val="FFFFFF"/>
-                </a:solidFill>
-              </a14:hiddenFill>
-            </a:ext>
-          </a:extLst>
-        </p:spPr>
-      </p:pic>
       <p:sp>
         <p:nvSpPr>
           <p:cNvPr id="22" name="Textfeld 21"/>
@@ -5461,8 +5516,8 @@
         </p:nvSpPr>
         <p:spPr>
           <a:xfrm>
-            <a:off x="3803544" y="20267893"/>
-            <a:ext cx="7505941" cy="1107996"/>
+            <a:off x="5240653" y="19482125"/>
+            <a:ext cx="3485190" cy="1107996"/>
           </a:xfrm>
           <a:prstGeom prst="rect">
             <a:avLst/>
@@ -5491,7 +5546,7 @@
         </p:nvSpPr>
         <p:spPr>
           <a:xfrm>
-            <a:off x="15514398" y="20311266"/>
+            <a:off x="14672860" y="19419896"/>
             <a:ext cx="12961440" cy="1107996"/>
           </a:xfrm>
           <a:prstGeom prst="rect">
@@ -5553,8 +5608,8 @@
         </p:nvSpPr>
         <p:spPr>
           <a:xfrm>
-            <a:off x="1528094" y="21848066"/>
-            <a:ext cx="9608872" cy="6617196"/>
+            <a:off x="1936973" y="20823547"/>
+            <a:ext cx="10092550" cy="9725739"/>
           </a:xfrm>
           <a:prstGeom prst="rect">
             <a:avLst/>
@@ -5567,6 +5622,11 @@
           </a:bodyPr>
           <a:lstStyle/>
           <a:p>
+            <a:pPr>
+              <a:lnSpc>
+                <a:spcPct val="150000"/>
+              </a:lnSpc>
+            </a:pPr>
             <a:r>
               <a:rPr lang="en-GB" sz="3200" dirty="0" smtClean="0"/>
               <a:t>1.Step: Creation of seeds</a:t>
@@ -5578,7 +5638,7 @@
               <a:buChar char="•"/>
             </a:pPr>
             <a:r>
-              <a:rPr lang="en-GB" sz="2000" dirty="0" smtClean="0"/>
+              <a:rPr lang="en-GB" sz="2400" dirty="0" smtClean="0"/>
               <a:t>Read is too long for single mapping</a:t>
             </a:r>
           </a:p>
@@ -5588,16 +5648,8 @@
               <a:buChar char="•"/>
             </a:pPr>
             <a:r>
-              <a:rPr lang="en-GB" sz="2000" dirty="0" smtClean="0"/>
-              <a:t>Detection of </a:t>
-            </a:r>
-            <a:r>
-              <a:rPr lang="en-GB" sz="2000" dirty="0" err="1" smtClean="0"/>
-              <a:t>seedlength</a:t>
-            </a:r>
-            <a:r>
-              <a:rPr lang="en-GB" sz="2000" dirty="0" smtClean="0"/>
-              <a:t> with best results</a:t>
+              <a:rPr lang="en-GB" sz="2400" dirty="0" smtClean="0"/>
+              <a:t>Detection of seed length with best results</a:t>
             </a:r>
           </a:p>
           <a:p>
@@ -5606,7 +5658,7 @@
               <a:buChar char="•"/>
             </a:pPr>
             <a:r>
-              <a:rPr lang="en-GB" sz="2000" dirty="0" smtClean="0"/>
+              <a:rPr lang="en-GB" sz="2400" dirty="0" smtClean="0"/>
               <a:t>Seeding with fix shift and fix length (5 and **)</a:t>
             </a:r>
           </a:p>
@@ -5616,7 +5668,7 @@
               <a:buChar char="•"/>
             </a:pPr>
             <a:r>
-              <a:rPr lang="en-GB" sz="2000" dirty="0" smtClean="0"/>
+              <a:rPr lang="en-GB" sz="2400" dirty="0" smtClean="0"/>
               <a:t>Template and Complement</a:t>
             </a:r>
           </a:p>
@@ -5626,14 +5678,19 @@
               <a:buChar char="•"/>
             </a:pPr>
             <a:r>
-              <a:rPr lang="en-GB" sz="2000" dirty="0" smtClean="0"/>
-              <a:t>End-to-end mapping with Bowtie allowing one Mismatch</a:t>
+              <a:rPr lang="en-GB" sz="2400" dirty="0" smtClean="0"/>
+              <a:t>End-to-end mapping with “Bowtie” allowing one Mismatch</a:t>
             </a:r>
           </a:p>
           <a:p>
             <a:endParaRPr lang="en-GB" sz="2000" dirty="0"/>
           </a:p>
           <a:p>
+            <a:pPr>
+              <a:lnSpc>
+                <a:spcPct val="150000"/>
+              </a:lnSpc>
+            </a:pPr>
             <a:r>
               <a:rPr lang="en-GB" sz="3600" dirty="0" smtClean="0"/>
               <a:t>2.Step: Creation of overlapping seed-chains</a:t>
@@ -5645,7 +5702,7 @@
               <a:buChar char="•"/>
             </a:pPr>
             <a:r>
-              <a:rPr lang="en-GB" sz="2000" dirty="0" smtClean="0"/>
+              <a:rPr lang="en-GB" sz="2400" dirty="0" smtClean="0"/>
               <a:t>Order of mapping could be wrong</a:t>
             </a:r>
           </a:p>
@@ -5655,7 +5712,7 @@
               <a:buChar char="•"/>
             </a:pPr>
             <a:r>
-              <a:rPr lang="en-GB" sz="2000" dirty="0" smtClean="0"/>
+              <a:rPr lang="en-GB" sz="2400" dirty="0" smtClean="0"/>
               <a:t>Unification of overlapping seeds when in shift range</a:t>
             </a:r>
           </a:p>
@@ -5665,15 +5722,15 @@
               <a:buChar char="•"/>
             </a:pPr>
             <a:r>
-              <a:rPr lang="en-GB" sz="2000" dirty="0" smtClean="0"/>
+              <a:rPr lang="en-GB" sz="2400" dirty="0" smtClean="0"/>
               <a:t>All seed-chains one the same chromosome were collected and written in a </a:t>
             </a:r>
             <a:r>
-              <a:rPr lang="en-GB" sz="2000" i="1" dirty="0" err="1" smtClean="0"/>
-              <a:t>fastm</a:t>
-            </a:r>
-            <a:r>
-              <a:rPr lang="en-GB" sz="2000" dirty="0" smtClean="0"/>
+              <a:rPr lang="en-GB" sz="2400" i="1" dirty="0" err="1" smtClean="0"/>
+              <a:t>fastM</a:t>
+            </a:r>
+            <a:r>
+              <a:rPr lang="en-GB" sz="2400" dirty="0" smtClean="0"/>
               <a:t> file</a:t>
             </a:r>
           </a:p>
@@ -5681,7 +5738,11 @@
             <a:endParaRPr lang="en-GB" sz="2000" dirty="0"/>
           </a:p>
           <a:p>
-            <a:pPr lvl="0"/>
+            <a:pPr lvl="0">
+              <a:lnSpc>
+                <a:spcPct val="150000"/>
+              </a:lnSpc>
+            </a:pPr>
             <a:r>
               <a:rPr lang="en-GB" sz="3600" dirty="0" smtClean="0">
                 <a:solidFill>
@@ -5704,43 +5765,44 @@
                   <a:prstClr val="black"/>
                 </a:solidFill>
               </a:rPr>
-              <a:t>Alignment of missing read parts</a:t>
-            </a:r>
-          </a:p>
-          <a:p>
-            <a:pPr lvl="0"/>
-            <a:r>
-              <a:rPr lang="en-GB" sz="2000" dirty="0" smtClean="0">
+              <a:t>Pathing of missing read parts</a:t>
+            </a:r>
+            <a:endParaRPr lang="en-GB" sz="3600" dirty="0">
+              <a:solidFill>
+                <a:prstClr val="black"/>
+              </a:solidFill>
+            </a:endParaRPr>
+          </a:p>
+          <a:p>
+            <a:pPr marL="342900" lvl="0" indent="-342900">
+              <a:buFont typeface="Arial" charset="0"/>
+              <a:buChar char="•"/>
+            </a:pPr>
+            <a:r>
+              <a:rPr lang="en-GB" sz="2400" dirty="0" smtClean="0">
                 <a:solidFill>
                   <a:prstClr val="black"/>
                 </a:solidFill>
               </a:rPr>
-              <a:t>~</a:t>
-            </a:r>
-            <a:r>
-              <a:rPr lang="en-GB" sz="2000" dirty="0" err="1" smtClean="0">
+              <a:t>Gaps between seed-chains are too big for alignment</a:t>
+            </a:r>
+          </a:p>
+          <a:p>
+            <a:pPr marL="342900" lvl="0" indent="-342900">
+              <a:buFont typeface="Arial" charset="0"/>
+              <a:buChar char="•"/>
+            </a:pPr>
+            <a:r>
+              <a:rPr lang="en-GB" sz="2400" dirty="0" smtClean="0">
                 <a:solidFill>
                   <a:prstClr val="black"/>
                 </a:solidFill>
               </a:rPr>
-              <a:t>bla</a:t>
-            </a:r>
-            <a:r>
-              <a:rPr lang="en-GB" sz="2000" dirty="0" smtClean="0">
-                <a:solidFill>
-                  <a:prstClr val="black"/>
-                </a:solidFill>
-              </a:rPr>
-              <a:t> </a:t>
-            </a:r>
-            <a:r>
-              <a:rPr lang="en-GB" sz="2000" dirty="0" err="1" smtClean="0">
-                <a:solidFill>
-                  <a:prstClr val="black"/>
-                </a:solidFill>
-              </a:rPr>
-              <a:t>blabla</a:t>
-            </a:r>
+              <a:t>Calculation of all possible exon / intron paths</a:t>
+            </a:r>
+          </a:p>
+          <a:p>
+            <a:pPr lvl="0"/>
             <a:endParaRPr lang="en-GB" sz="2000" dirty="0" smtClean="0">
               <a:solidFill>
                 <a:prstClr val="black"/>
@@ -5748,166 +5810,71 @@
             </a:endParaRPr>
           </a:p>
           <a:p>
-            <a:pPr lvl="0"/>
-            <a:r>
-              <a:rPr lang="en-GB" sz="2000" dirty="0" smtClean="0">
+            <a:pPr lvl="0">
+              <a:lnSpc>
+                <a:spcPct val="150000"/>
+              </a:lnSpc>
+            </a:pPr>
+            <a:r>
+              <a:rPr lang="en-GB" sz="3600" dirty="0" smtClean="0">
                 <a:solidFill>
                   <a:prstClr val="black"/>
                 </a:solidFill>
               </a:rPr>
-              <a:t>~</a:t>
-            </a:r>
-          </a:p>
-          <a:p>
-            <a:pPr lvl="0"/>
-            <a:r>
-              <a:rPr lang="en-GB" sz="2000" dirty="0" smtClean="0">
+              <a:t>4.Step</a:t>
+            </a:r>
+            <a:r>
+              <a:rPr lang="en-GB" sz="3600" dirty="0">
                 <a:solidFill>
                   <a:prstClr val="black"/>
                 </a:solidFill>
               </a:rPr>
-              <a:t>~</a:t>
-            </a:r>
-          </a:p>
-          <a:p>
-            <a:pPr lvl="0"/>
-            <a:r>
-              <a:rPr lang="en-GB" sz="2000" dirty="0">
+              <a:t>: </a:t>
+            </a:r>
+            <a:r>
+              <a:rPr lang="en-GB" sz="3600" dirty="0" smtClean="0">
                 <a:solidFill>
                   <a:prstClr val="black"/>
                 </a:solidFill>
               </a:rPr>
-              <a:t>~</a:t>
-            </a:r>
-          </a:p>
-          <a:p>
-            <a:endParaRPr lang="en-GB" sz="2000" dirty="0"/>
-          </a:p>
-        </p:txBody>
-      </p:sp>
-      <p:pic>
-        <p:nvPicPr>
-          <p:cNvPr id="1034" name="Picture 10" descr="https://scontent-fra3-1.xx.fbcdn.net/v/t34.0-12/18110745_10210563191931056_777435008_n.png?oh=41c76ba5c45b162bcc6c1233a8f8c814&amp;oe=58FDB404"/>
-          <p:cNvPicPr>
-            <a:picLocks noChangeAspect="1" noChangeArrowheads="1"/>
-          </p:cNvPicPr>
-          <p:nvPr/>
-        </p:nvPicPr>
-        <p:blipFill>
-          <a:blip r:embed="rId7">
-            <a:extLst>
-              <a:ext uri="{28A0092B-C50C-407E-A947-70E740481C1C}">
-                <a14:useLocalDpi xmlns:a14="http://schemas.microsoft.com/office/drawing/2010/main" val="0"/>
-              </a:ext>
-            </a:extLst>
-          </a:blip>
-          <a:srcRect/>
-          <a:stretch>
-            <a:fillRect/>
-          </a:stretch>
-        </p:blipFill>
-        <p:spPr bwMode="auto">
-          <a:xfrm>
-            <a:off x="18348243" y="26181328"/>
-            <a:ext cx="5453638" cy="4362911"/>
-          </a:xfrm>
-          <a:prstGeom prst="rect">
-            <a:avLst/>
-          </a:prstGeom>
-          <a:noFill/>
-          <a:extLst>
-            <a:ext uri="{909E8E84-426E-40DD-AFC4-6F175D3DCCD1}">
-              <a14:hiddenFill xmlns:a14="http://schemas.microsoft.com/office/drawing/2010/main">
+              <a:t>Alignment</a:t>
+            </a:r>
+          </a:p>
+          <a:p>
+            <a:pPr marL="342900" lvl="0" indent="-342900">
+              <a:buFont typeface="Arial" charset="0"/>
+              <a:buChar char="•"/>
+            </a:pPr>
+            <a:r>
+              <a:rPr lang="en-GB" sz="2400" dirty="0" smtClean="0">
                 <a:solidFill>
-                  <a:srgbClr val="FFFFFF"/>
+                  <a:prstClr val="black"/>
                 </a:solidFill>
-              </a14:hiddenFill>
-            </a:ext>
-          </a:extLst>
-        </p:spPr>
-      </p:pic>
-      <p:pic>
-        <p:nvPicPr>
-          <p:cNvPr id="1036" name="Picture 12" descr="https://scontent-fra3-1.xx.fbcdn.net/v/t34.0-12/18072852_10210563192651074_1945915284_n.png?oh=d1fcff5cf997e61c1016eedb5e895139&amp;oe=58FD58DB"/>
-          <p:cNvPicPr>
-            <a:picLocks noChangeAspect="1" noChangeArrowheads="1"/>
-          </p:cNvPicPr>
-          <p:nvPr/>
-        </p:nvPicPr>
-        <p:blipFill>
-          <a:blip r:embed="rId8">
-            <a:extLst>
-              <a:ext uri="{28A0092B-C50C-407E-A947-70E740481C1C}">
-                <a14:useLocalDpi xmlns:a14="http://schemas.microsoft.com/office/drawing/2010/main" val="0"/>
-              </a:ext>
-            </a:extLst>
-          </a:blip>
-          <a:srcRect/>
-          <a:stretch>
-            <a:fillRect/>
-          </a:stretch>
-        </p:blipFill>
-        <p:spPr bwMode="auto">
-          <a:xfrm>
-            <a:off x="24010461" y="21775696"/>
-            <a:ext cx="5381905" cy="4305524"/>
-          </a:xfrm>
-          <a:prstGeom prst="rect">
-            <a:avLst/>
-          </a:prstGeom>
-          <a:noFill/>
-          <a:extLst>
-            <a:ext uri="{909E8E84-426E-40DD-AFC4-6F175D3DCCD1}">
-              <a14:hiddenFill xmlns:a14="http://schemas.microsoft.com/office/drawing/2010/main">
+              </a:rPr>
+              <a:t>Alignment of all previously detected paths</a:t>
+            </a:r>
+          </a:p>
+          <a:p>
+            <a:pPr marL="342900" lvl="0" indent="-342900">
+              <a:buFont typeface="Arial" charset="0"/>
+              <a:buChar char="•"/>
+            </a:pPr>
+            <a:r>
+              <a:rPr lang="en-GB" sz="2400" dirty="0" smtClean="0">
                 <a:solidFill>
-                  <a:srgbClr val="FFFFFF"/>
+                  <a:prstClr val="black"/>
                 </a:solidFill>
-              </a14:hiddenFill>
-            </a:ext>
-          </a:extLst>
-        </p:spPr>
-      </p:pic>
-      <p:pic>
-        <p:nvPicPr>
-          <p:cNvPr id="1038" name="Picture 14" descr="https://scontent-fra3-1.xx.fbcdn.net/v/t34.0-12/18035586_10210563240492270_771014958_n.png?oh=64254a123e94e811df1a4aa74716e63f&amp;oe=58FD683F"/>
-          <p:cNvPicPr>
-            <a:picLocks noChangeAspect="1" noChangeArrowheads="1"/>
-          </p:cNvPicPr>
-          <p:nvPr/>
-        </p:nvPicPr>
-        <p:blipFill>
-          <a:blip r:embed="rId9">
-            <a:extLst>
-              <a:ext uri="{28A0092B-C50C-407E-A947-70E740481C1C}">
-                <a14:useLocalDpi xmlns:a14="http://schemas.microsoft.com/office/drawing/2010/main" val="0"/>
-              </a:ext>
-            </a:extLst>
-          </a:blip>
-          <a:srcRect/>
-          <a:stretch>
-            <a:fillRect/>
-          </a:stretch>
-        </p:blipFill>
-        <p:spPr bwMode="auto">
-          <a:xfrm>
-            <a:off x="24010461" y="26367585"/>
-            <a:ext cx="5059304" cy="4047443"/>
-          </a:xfrm>
-          <a:prstGeom prst="rect">
-            <a:avLst/>
-          </a:prstGeom>
-          <a:noFill/>
-          <a:extLst>
-            <a:ext uri="{909E8E84-426E-40DD-AFC4-6F175D3DCCD1}">
-              <a14:hiddenFill xmlns:a14="http://schemas.microsoft.com/office/drawing/2010/main">
-                <a:solidFill>
-                  <a:srgbClr val="FFFFFF"/>
-                </a:solidFill>
-              </a14:hiddenFill>
-            </a:ext>
-          </a:extLst>
-        </p:spPr>
-      </p:pic>
+              </a:rPr>
+              <a:t>Comparison of alignment scores and stitching of the best path combinations</a:t>
+            </a:r>
+            <a:endParaRPr lang="en-GB" sz="2400" dirty="0">
+              <a:solidFill>
+                <a:prstClr val="black"/>
+              </a:solidFill>
+            </a:endParaRPr>
+          </a:p>
+        </p:txBody>
+      </p:sp>
       <p:sp>
         <p:nvSpPr>
           <p:cNvPr id="29" name="Textfeld 28"/>
@@ -5948,7 +5915,7 @@
           <p:nvPr/>
         </p:nvPicPr>
         <p:blipFill>
-          <a:blip r:embed="rId10">
+          <a:blip r:embed="rId6">
             <a:extLst>
               <a:ext uri="{28A0092B-C50C-407E-A947-70E740481C1C}">
                 <a14:useLocalDpi xmlns:a14="http://schemas.microsoft.com/office/drawing/2010/main" val="0"/>
@@ -5989,7 +5956,7 @@
           <p:nvPr/>
         </p:nvPicPr>
         <p:blipFill>
-          <a:blip r:embed="rId11">
+          <a:blip r:embed="rId7">
             <a:extLst>
               <a:ext uri="{28A0092B-C50C-407E-A947-70E740481C1C}">
                 <a14:useLocalDpi xmlns:a14="http://schemas.microsoft.com/office/drawing/2010/main" val="0"/>
@@ -6030,7 +5997,7 @@
           <p:nvPr/>
         </p:nvPicPr>
         <p:blipFill>
-          <a:blip r:embed="rId12">
+          <a:blip r:embed="rId8">
             <a:extLst>
               <a:ext uri="{28A0092B-C50C-407E-A947-70E740481C1C}">
                 <a14:useLocalDpi xmlns:a14="http://schemas.microsoft.com/office/drawing/2010/main" val="0"/>
@@ -6071,7 +6038,7 @@
           <p:nvPr/>
         </p:nvPicPr>
         <p:blipFill>
-          <a:blip r:embed="rId13">
+          <a:blip r:embed="rId9">
             <a:extLst>
               <a:ext uri="{28A0092B-C50C-407E-A947-70E740481C1C}">
                 <a14:useLocalDpi xmlns:a14="http://schemas.microsoft.com/office/drawing/2010/main" val="0"/>
@@ -7165,7 +7132,7 @@
           <p:nvPr/>
         </p:nvPicPr>
         <p:blipFill>
-          <a:blip r:embed="rId14"/>
+          <a:blip r:embed="rId10"/>
           <a:stretch>
             <a:fillRect/>
           </a:stretch>
@@ -7188,8 +7155,8 @@
         </p:nvSpPr>
         <p:spPr>
           <a:xfrm>
-            <a:off x="155574" y="14746610"/>
-            <a:ext cx="7158457" cy="1754326"/>
+            <a:off x="5733468" y="12966194"/>
+            <a:ext cx="6974556" cy="2308324"/>
           </a:xfrm>
           <a:prstGeom prst="rect">
             <a:avLst/>
@@ -7201,20 +7168,66 @@
           </a:bodyPr>
           <a:lstStyle/>
           <a:p>
-            <a:pPr algn="just"/>
-            <a:r>
-              <a:rPr lang="en-GB" sz="1800" dirty="0"/>
-              <a:t>The basis of this technology is the protein </a:t>
-            </a:r>
-            <a:r>
-              <a:rPr lang="en-GB" sz="1800" dirty="0" smtClean="0"/>
-              <a:t>nanopore. Due </a:t>
-            </a:r>
-            <a:r>
-              <a:rPr lang="en-GB" sz="1800" dirty="0"/>
-              <a:t>to the high electrical resistance of the membrane an electric current can be generated through the nanopore when applying a potential across the membrane. If a single molecule passes through the pore, this event creates a characteristic disruption in current, called the nanopore signal. </a:t>
-            </a:r>
-            <a:endParaRPr lang="de-DE" sz="1800" dirty="0"/>
+            <a:pPr marL="285750" indent="-285750" algn="just">
+              <a:buFontTx/>
+              <a:buChar char="-"/>
+            </a:pPr>
+            <a:r>
+              <a:rPr lang="en-GB" sz="2400" dirty="0" smtClean="0"/>
+              <a:t>A </a:t>
+            </a:r>
+            <a:r>
+              <a:rPr lang="en-GB" sz="2400" dirty="0"/>
+              <a:t>protein </a:t>
+            </a:r>
+            <a:r>
+              <a:rPr lang="en-GB" sz="2400" dirty="0" err="1"/>
+              <a:t>nanopore</a:t>
+            </a:r>
+            <a:r>
+              <a:rPr lang="en-GB" sz="2400" dirty="0"/>
+              <a:t> is set in an electrically-resistant polymer </a:t>
+            </a:r>
+            <a:r>
+              <a:rPr lang="en-GB" sz="2400" dirty="0" smtClean="0"/>
+              <a:t>membrane</a:t>
+            </a:r>
+          </a:p>
+          <a:p>
+            <a:pPr marL="285750" indent="-285750" algn="just">
+              <a:buFontTx/>
+              <a:buChar char="-"/>
+            </a:pPr>
+            <a:r>
+              <a:rPr lang="en-GB" sz="2400" dirty="0" smtClean="0"/>
+              <a:t>Electric current generated through the </a:t>
+            </a:r>
+            <a:r>
+              <a:rPr lang="en-GB" sz="2400" dirty="0" err="1" smtClean="0"/>
+              <a:t>nanopore</a:t>
+            </a:r>
+            <a:r>
+              <a:rPr lang="en-GB" sz="2400" dirty="0" smtClean="0"/>
+              <a:t> when applying a potential across the membrane</a:t>
+            </a:r>
+          </a:p>
+          <a:p>
+            <a:pPr marL="285750" indent="-285750" algn="just">
+              <a:buFontTx/>
+              <a:buChar char="-"/>
+            </a:pPr>
+            <a:r>
+              <a:rPr lang="en-GB" sz="2400" dirty="0" smtClean="0"/>
+              <a:t>Passing molecule create characteristic disruption in current, called the </a:t>
+            </a:r>
+            <a:r>
+              <a:rPr lang="en-GB" sz="2400" dirty="0" err="1" smtClean="0"/>
+              <a:t>nanopore</a:t>
+            </a:r>
+            <a:r>
+              <a:rPr lang="en-GB" sz="2400" dirty="0" smtClean="0"/>
+              <a:t> signal</a:t>
+            </a:r>
           </a:p>
         </p:txBody>
       </p:sp>
@@ -7227,7 +7240,7 @@
           <p:nvPr/>
         </p:nvPicPr>
         <p:blipFill>
-          <a:blip r:embed="rId15">
+          <a:blip r:embed="rId11">
             <a:extLst>
               <a:ext uri="{28A0092B-C50C-407E-A947-70E740481C1C}">
                 <a14:useLocalDpi xmlns:a14="http://schemas.microsoft.com/office/drawing/2010/main" val="0"/>
@@ -7241,8 +7254,8 @@
         </p:blipFill>
         <p:spPr bwMode="auto">
           <a:xfrm>
-            <a:off x="880022" y="16485583"/>
-            <a:ext cx="4070925" cy="2300000"/>
+            <a:off x="818927" y="12966194"/>
+            <a:ext cx="4421726" cy="2677656"/>
           </a:xfrm>
           <a:prstGeom prst="rect">
             <a:avLst/>
@@ -7267,8 +7280,8 @@
         </p:nvSpPr>
         <p:spPr>
           <a:xfrm>
-            <a:off x="7162652" y="12332410"/>
-            <a:ext cx="1584176" cy="1175832"/>
+            <a:off x="13200839" y="13748522"/>
+            <a:ext cx="1084652" cy="1175832"/>
           </a:xfrm>
           <a:prstGeom prst="rightArrow">
             <a:avLst/>
@@ -7299,14 +7312,206 @@
       </p:sp>
       <p:sp>
         <p:nvSpPr>
-          <p:cNvPr id="37" name="Pfeil nach rechts 36"/>
+          <p:cNvPr id="40" name="Textfeld 39"/>
+          <p:cNvSpPr txBox="1"/>
+          <p:nvPr/>
+        </p:nvSpPr>
+        <p:spPr>
+          <a:xfrm>
+            <a:off x="24714671" y="10554463"/>
+            <a:ext cx="4816360" cy="1446550"/>
+          </a:xfrm>
+          <a:prstGeom prst="rect">
+            <a:avLst/>
+          </a:prstGeom>
+          <a:noFill/>
+        </p:spPr>
+        <p:txBody>
+          <a:bodyPr wrap="square" rtlCol="0">
+            <a:spAutoFit/>
+          </a:bodyPr>
+          <a:lstStyle/>
+          <a:p>
+            <a:pPr marL="342900" indent="-342900">
+              <a:buFont typeface="Wingdings" panose="05000000000000000000" pitchFamily="2" charset="2"/>
+              <a:buChar char="Ø"/>
+            </a:pPr>
+            <a:r>
+              <a:rPr lang="de-DE" sz="4400" dirty="0" smtClean="0"/>
+              <a:t> </a:t>
+            </a:r>
+            <a:r>
+              <a:rPr lang="de-DE" sz="4400" dirty="0" err="1" smtClean="0"/>
+              <a:t>Few</a:t>
+            </a:r>
+            <a:r>
+              <a:rPr lang="de-DE" sz="4400" dirty="0" smtClean="0"/>
+              <a:t>, </a:t>
+            </a:r>
+            <a:r>
+              <a:rPr lang="de-DE" sz="4400" dirty="0" err="1" smtClean="0"/>
+              <a:t>long</a:t>
+            </a:r>
+            <a:r>
+              <a:rPr lang="de-DE" sz="4400" dirty="0" smtClean="0"/>
+              <a:t> </a:t>
+            </a:r>
+            <a:r>
+              <a:rPr lang="de-DE" sz="4400" dirty="0" err="1" smtClean="0"/>
+              <a:t>reads</a:t>
+            </a:r>
+            <a:endParaRPr lang="de-DE" sz="4400" dirty="0" smtClean="0"/>
+          </a:p>
+          <a:p>
+            <a:pPr marL="342900" indent="-342900">
+              <a:buFont typeface="Wingdings" panose="05000000000000000000" pitchFamily="2" charset="2"/>
+              <a:buChar char="Ø"/>
+            </a:pPr>
+            <a:r>
+              <a:rPr lang="de-DE" sz="4400" dirty="0" smtClean="0"/>
+              <a:t> High </a:t>
+            </a:r>
+            <a:r>
+              <a:rPr lang="de-DE" sz="4400" dirty="0" err="1" smtClean="0"/>
+              <a:t>error</a:t>
+            </a:r>
+            <a:r>
+              <a:rPr lang="de-DE" sz="4400" dirty="0" smtClean="0"/>
+              <a:t> rate</a:t>
+            </a:r>
+          </a:p>
+        </p:txBody>
+      </p:sp>
+      <p:pic>
+        <p:nvPicPr>
+          <p:cNvPr id="12" name="Grafik 11"/>
+          <p:cNvPicPr>
+            <a:picLocks noChangeAspect="1"/>
+          </p:cNvPicPr>
+          <p:nvPr/>
+        </p:nvPicPr>
+        <p:blipFill>
+          <a:blip r:embed="rId12">
+            <a:extLst>
+              <a:ext uri="{28A0092B-C50C-407E-A947-70E740481C1C}">
+                <a14:useLocalDpi xmlns:a14="http://schemas.microsoft.com/office/drawing/2010/main" val="0"/>
+              </a:ext>
+            </a:extLst>
+          </a:blip>
+          <a:stretch>
+            <a:fillRect/>
+          </a:stretch>
+        </p:blipFill>
+        <p:spPr>
+          <a:xfrm>
+            <a:off x="14427182" y="14543901"/>
+            <a:ext cx="4301978" cy="3441583"/>
+          </a:xfrm>
+          <a:prstGeom prst="rect">
+            <a:avLst/>
+          </a:prstGeom>
+        </p:spPr>
+      </p:pic>
+      <p:pic>
+        <p:nvPicPr>
+          <p:cNvPr id="18" name="Grafik 17"/>
+          <p:cNvPicPr>
+            <a:picLocks noChangeAspect="1"/>
+          </p:cNvPicPr>
+          <p:nvPr/>
+        </p:nvPicPr>
+        <p:blipFill>
+          <a:blip r:embed="rId13">
+            <a:extLst>
+              <a:ext uri="{28A0092B-C50C-407E-A947-70E740481C1C}">
+                <a14:useLocalDpi xmlns:a14="http://schemas.microsoft.com/office/drawing/2010/main" val="0"/>
+              </a:ext>
+            </a:extLst>
+          </a:blip>
+          <a:stretch>
+            <a:fillRect/>
+          </a:stretch>
+        </p:blipFill>
+        <p:spPr>
+          <a:xfrm>
+            <a:off x="19482775" y="14543901"/>
+            <a:ext cx="4271163" cy="3416931"/>
+          </a:xfrm>
+          <a:prstGeom prst="rect">
+            <a:avLst/>
+          </a:prstGeom>
+        </p:spPr>
+      </p:pic>
+      <p:pic>
+        <p:nvPicPr>
+          <p:cNvPr id="19" name="Grafik 18"/>
+          <p:cNvPicPr>
+            <a:picLocks noChangeAspect="1"/>
+          </p:cNvPicPr>
+          <p:nvPr/>
+        </p:nvPicPr>
+        <p:blipFill>
+          <a:blip r:embed="rId14">
+            <a:extLst>
+              <a:ext uri="{28A0092B-C50C-407E-A947-70E740481C1C}">
+                <a14:useLocalDpi xmlns:a14="http://schemas.microsoft.com/office/drawing/2010/main" val="0"/>
+              </a:ext>
+            </a:extLst>
+          </a:blip>
+          <a:stretch>
+            <a:fillRect/>
+          </a:stretch>
+        </p:blipFill>
+        <p:spPr>
+          <a:xfrm>
+            <a:off x="19402742" y="10382085"/>
+            <a:ext cx="4900069" cy="3920056"/>
+          </a:xfrm>
+          <a:prstGeom prst="rect">
+            <a:avLst/>
+          </a:prstGeom>
+        </p:spPr>
+      </p:pic>
+      <p:pic>
+        <p:nvPicPr>
+          <p:cNvPr id="20" name="Grafik 19"/>
+          <p:cNvPicPr>
+            <a:picLocks noChangeAspect="1"/>
+          </p:cNvPicPr>
+          <p:nvPr/>
+        </p:nvPicPr>
+        <p:blipFill>
+          <a:blip r:embed="rId15">
+            <a:extLst>
+              <a:ext uri="{28A0092B-C50C-407E-A947-70E740481C1C}">
+                <a14:useLocalDpi xmlns:a14="http://schemas.microsoft.com/office/drawing/2010/main" val="0"/>
+              </a:ext>
+            </a:extLst>
+          </a:blip>
+          <a:stretch>
+            <a:fillRect/>
+          </a:stretch>
+        </p:blipFill>
+        <p:spPr>
+          <a:xfrm>
+            <a:off x="14394349" y="10335225"/>
+            <a:ext cx="4900069" cy="3920056"/>
+          </a:xfrm>
+          <a:prstGeom prst="rect">
+            <a:avLst/>
+          </a:prstGeom>
+        </p:spPr>
+      </p:pic>
+      <p:sp>
+        <p:nvSpPr>
+          <p:cNvPr id="44" name="Pfeil nach rechts 43"/>
           <p:cNvSpPr/>
           <p:nvPr/>
         </p:nvSpPr>
         <p:spPr>
-          <a:xfrm>
-            <a:off x="-1436181" y="9843807"/>
-            <a:ext cx="1584176" cy="1175832"/>
+          <a:xfrm rot="5400000">
+            <a:off x="26144367" y="12505500"/>
+            <a:ext cx="1114091" cy="1175832"/>
           </a:xfrm>
           <a:prstGeom prst="rightArrow">
             <a:avLst/>
@@ -7337,116 +7542,14 @@
       </p:sp>
       <p:sp>
         <p:nvSpPr>
-          <p:cNvPr id="17" name="Rechteck 16"/>
-          <p:cNvSpPr/>
+          <p:cNvPr id="45" name="Textfeld 44"/>
+          <p:cNvSpPr txBox="1"/>
           <p:nvPr/>
         </p:nvSpPr>
         <p:spPr>
           <a:xfrm>
-            <a:off x="22705036" y="14656356"/>
-            <a:ext cx="5223701" cy="3591573"/>
-          </a:xfrm>
-          <a:prstGeom prst="rect">
-            <a:avLst/>
-          </a:prstGeom>
-        </p:spPr>
-        <p:txBody>
-          <a:bodyPr wrap="square">
-            <a:spAutoFit/>
-          </a:bodyPr>
-          <a:lstStyle/>
-          <a:p>
-            <a:r>
-              <a:rPr lang="en-GB" sz="2000" dirty="0" smtClean="0"/>
-              <a:t>Here </a:t>
-            </a:r>
-            <a:r>
-              <a:rPr lang="en-GB" sz="2000" dirty="0"/>
-              <a:t>we compare mappings of three available mappers (LAST, BWA and </a:t>
-            </a:r>
-            <a:r>
-              <a:rPr lang="en-GB" sz="2000" dirty="0" err="1"/>
-              <a:t>GraphMap</a:t>
-            </a:r>
-            <a:r>
-              <a:rPr lang="en-GB" sz="2000" dirty="0"/>
-              <a:t>) on a real and a simulated data set. In fact that differential expression and alternative splicing analysis are nowadays common it became important to work on </a:t>
-            </a:r>
-            <a:r>
-              <a:rPr lang="en-GB" sz="2000" dirty="0" err="1"/>
-              <a:t>RNAseq</a:t>
-            </a:r>
-            <a:r>
-              <a:rPr lang="en-GB" sz="2000" dirty="0"/>
-              <a:t> data.  Since only </a:t>
-            </a:r>
-            <a:r>
-              <a:rPr lang="en-GB" sz="2000" dirty="0" err="1"/>
-              <a:t>GraphMap</a:t>
-            </a:r>
-            <a:r>
-              <a:rPr lang="en-GB" sz="2000" dirty="0"/>
-              <a:t> has published an option for a transcriptomic mapping, the goal of our project is to create a specific mapper for </a:t>
-            </a:r>
-            <a:r>
-              <a:rPr lang="en-GB" sz="2000" dirty="0" err="1"/>
-              <a:t>MinION</a:t>
-            </a:r>
-            <a:r>
-              <a:rPr lang="en-GB" sz="2000" dirty="0"/>
-              <a:t> Reads of the transcriptome.</a:t>
-            </a:r>
-          </a:p>
-        </p:txBody>
-      </p:sp>
-      <p:sp>
-        <p:nvSpPr>
-          <p:cNvPr id="39" name="Pfeil nach rechts 38"/>
-          <p:cNvSpPr/>
-          <p:nvPr/>
-        </p:nvSpPr>
-        <p:spPr>
-          <a:xfrm>
-            <a:off x="22548453" y="11592151"/>
-            <a:ext cx="1584176" cy="1175832"/>
-          </a:xfrm>
-          <a:prstGeom prst="rightArrow">
-            <a:avLst/>
-          </a:prstGeom>
-        </p:spPr>
-        <p:style>
-          <a:lnRef idx="1">
-            <a:schemeClr val="accent1"/>
-          </a:lnRef>
-          <a:fillRef idx="3">
-            <a:schemeClr val="accent1"/>
-          </a:fillRef>
-          <a:effectRef idx="2">
-            <a:schemeClr val="accent1"/>
-          </a:effectRef>
-          <a:fontRef idx="minor">
-            <a:schemeClr val="lt1"/>
-          </a:fontRef>
-        </p:style>
-        <p:txBody>
-          <a:bodyPr rtlCol="0" anchor="ctr"/>
-          <a:lstStyle/>
-          <a:p>
-            <a:pPr algn="ctr"/>
-            <a:endParaRPr lang="de-DE"/>
-          </a:p>
-        </p:txBody>
-      </p:sp>
-      <p:sp>
-        <p:nvSpPr>
-          <p:cNvPr id="40" name="Textfeld 39"/>
-          <p:cNvSpPr txBox="1"/>
-          <p:nvPr/>
-        </p:nvSpPr>
-        <p:spPr>
-          <a:xfrm>
-            <a:off x="24576838" y="11394836"/>
-            <a:ext cx="3388957" cy="1508105"/>
+            <a:off x="24714672" y="14302141"/>
+            <a:ext cx="4816358" cy="4278094"/>
           </a:xfrm>
           <a:prstGeom prst="rect">
             <a:avLst/>
@@ -7459,22 +7562,43 @@
           </a:bodyPr>
           <a:lstStyle/>
           <a:p>
-            <a:endParaRPr lang="de-DE" sz="2000" dirty="0"/>
-          </a:p>
-          <a:p>
             <a:pPr marL="342900" indent="-342900">
               <a:buFont typeface="Wingdings" panose="05000000000000000000" pitchFamily="2" charset="2"/>
               <a:buChar char="Ø"/>
             </a:pPr>
             <a:r>
-              <a:rPr lang="de-DE" sz="2400" dirty="0" smtClean="0"/>
-              <a:t>Long </a:t>
-            </a:r>
-            <a:r>
-              <a:rPr lang="de-DE" sz="2400" dirty="0" err="1" smtClean="0"/>
-              <a:t>reads</a:t>
-            </a:r>
-            <a:endParaRPr lang="de-DE" sz="2400" dirty="0" smtClean="0"/>
+              <a:rPr lang="de-DE" sz="4400" dirty="0" smtClean="0"/>
+              <a:t> Demand </a:t>
+            </a:r>
+            <a:r>
+              <a:rPr lang="de-DE" sz="4400" dirty="0" err="1" smtClean="0"/>
+              <a:t>for</a:t>
+            </a:r>
+            <a:r>
+              <a:rPr lang="de-DE" sz="4400" dirty="0" smtClean="0"/>
+              <a:t> </a:t>
+            </a:r>
+            <a:r>
+              <a:rPr lang="de-DE" sz="4400" dirty="0" err="1" smtClean="0"/>
+              <a:t>new</a:t>
+            </a:r>
+            <a:r>
+              <a:rPr lang="de-DE" sz="4400" dirty="0" smtClean="0"/>
+              <a:t> </a:t>
+            </a:r>
+            <a:r>
+              <a:rPr lang="de-DE" sz="4400" dirty="0" err="1" smtClean="0"/>
+              <a:t>mapping</a:t>
+            </a:r>
+            <a:r>
+              <a:rPr lang="de-DE" sz="4400" dirty="0" smtClean="0"/>
+              <a:t> </a:t>
+            </a:r>
+            <a:r>
+              <a:rPr lang="de-DE" sz="4400" dirty="0" err="1" smtClean="0"/>
+              <a:t>approach</a:t>
+            </a:r>
+            <a:endParaRPr lang="de-DE" sz="4400" dirty="0" smtClean="0"/>
           </a:p>
           <a:p>
             <a:pPr marL="342900" indent="-342900">
@@ -7482,38 +7606,43 @@
               <a:buChar char="Ø"/>
             </a:pPr>
             <a:r>
-              <a:rPr lang="de-DE" sz="2400" dirty="0" smtClean="0"/>
-              <a:t>High </a:t>
-            </a:r>
-            <a:r>
-              <a:rPr lang="de-DE" sz="2400" dirty="0" err="1" smtClean="0"/>
-              <a:t>error</a:t>
-            </a:r>
-            <a:r>
-              <a:rPr lang="de-DE" sz="2400" dirty="0" smtClean="0"/>
-              <a:t> rate</a:t>
-            </a:r>
+              <a:rPr lang="de-DE" sz="4400" dirty="0" smtClean="0"/>
+              <a:t> </a:t>
+            </a:r>
+            <a:r>
+              <a:rPr lang="de-DE" sz="4400" dirty="0" err="1" smtClean="0"/>
+              <a:t>Enable</a:t>
+            </a:r>
+            <a:r>
+              <a:rPr lang="de-DE" sz="4400" dirty="0" smtClean="0"/>
+              <a:t> </a:t>
+            </a:r>
+            <a:r>
+              <a:rPr lang="de-DE" sz="4400" dirty="0" err="1" smtClean="0"/>
+              <a:t>transcriptomic</a:t>
+            </a:r>
+            <a:r>
+              <a:rPr lang="de-DE" sz="4400" dirty="0" smtClean="0"/>
+              <a:t> </a:t>
+            </a:r>
+            <a:r>
+              <a:rPr lang="de-DE" sz="4400" dirty="0" err="1" smtClean="0"/>
+              <a:t>mapping</a:t>
+            </a:r>
+            <a:endParaRPr lang="de-DE" sz="4400" dirty="0" smtClean="0"/>
           </a:p>
           <a:p>
             <a:pPr marL="342900" indent="-342900">
               <a:buFont typeface="Wingdings" panose="05000000000000000000" pitchFamily="2" charset="2"/>
               <a:buChar char="Ø"/>
             </a:pPr>
-            <a:r>
-              <a:rPr lang="de-DE" sz="2400" dirty="0" smtClean="0"/>
-              <a:t>Different </a:t>
-            </a:r>
-            <a:r>
-              <a:rPr lang="de-DE" sz="2400" dirty="0" err="1" smtClean="0"/>
-              <a:t>mapping</a:t>
-            </a:r>
-            <a:endParaRPr lang="de-DE" sz="2400" dirty="0" smtClean="0"/>
+            <a:endParaRPr lang="de-DE" sz="800" dirty="0" smtClean="0"/>
           </a:p>
         </p:txBody>
       </p:sp>
       <p:pic>
         <p:nvPicPr>
-          <p:cNvPr id="12" name="Grafik 11"/>
+          <p:cNvPr id="17" name="Bild 16"/>
           <p:cNvPicPr>
             <a:picLocks noChangeAspect="1"/>
           </p:cNvPicPr>
@@ -7533,8 +7662,8 @@
         </p:blipFill>
         <p:spPr>
           <a:xfrm>
-            <a:off x="9720399" y="10688011"/>
-            <a:ext cx="4301978" cy="3441583"/>
+            <a:off x="20092732" y="20669271"/>
+            <a:ext cx="9009677" cy="5405806"/>
           </a:xfrm>
           <a:prstGeom prst="rect">
             <a:avLst/>
@@ -7543,7 +7672,7 @@
       </p:pic>
       <p:pic>
         <p:nvPicPr>
-          <p:cNvPr id="18" name="Grafik 17"/>
+          <p:cNvPr id="21" name="Bild 20"/>
           <p:cNvPicPr>
             <a:picLocks noChangeAspect="1"/>
           </p:cNvPicPr>
@@ -7563,8 +7692,8 @@
         </p:blipFill>
         <p:spPr>
           <a:xfrm>
-            <a:off x="14682867" y="10707551"/>
-            <a:ext cx="4271163" cy="3416931"/>
+            <a:off x="12689334" y="20681801"/>
+            <a:ext cx="8991569" cy="5394941"/>
           </a:xfrm>
           <a:prstGeom prst="rect">
             <a:avLst/>
@@ -7573,7 +7702,7 @@
       </p:pic>
       <p:pic>
         <p:nvPicPr>
-          <p:cNvPr id="19" name="Grafik 18"/>
+          <p:cNvPr id="25" name="Bild 24"/>
           <p:cNvPicPr>
             <a:picLocks noChangeAspect="1"/>
           </p:cNvPicPr>
@@ -7593,8 +7722,8 @@
         </p:blipFill>
         <p:spPr>
           <a:xfrm>
-            <a:off x="9675927" y="14588357"/>
-            <a:ext cx="4743063" cy="3794451"/>
+            <a:off x="18605995" y="26082402"/>
+            <a:ext cx="5095171" cy="4045294"/>
           </a:xfrm>
           <a:prstGeom prst="rect">
             <a:avLst/>
@@ -7603,7 +7732,7 @@
       </p:pic>
       <p:pic>
         <p:nvPicPr>
-          <p:cNvPr id="20" name="Grafik 19"/>
+          <p:cNvPr id="26" name="Bild 25"/>
           <p:cNvPicPr>
             <a:picLocks noChangeAspect="1"/>
           </p:cNvPicPr>
@@ -7623,8 +7752,38 @@
         </p:blipFill>
         <p:spPr>
           <a:xfrm>
-            <a:off x="14915177" y="14569208"/>
-            <a:ext cx="4900069" cy="3920056"/>
+            <a:off x="13354484" y="26025782"/>
+            <a:ext cx="5201344" cy="4161076"/>
+          </a:xfrm>
+          <a:prstGeom prst="rect">
+            <a:avLst/>
+          </a:prstGeom>
+        </p:spPr>
+      </p:pic>
+      <p:pic>
+        <p:nvPicPr>
+          <p:cNvPr id="27" name="Bild 26"/>
+          <p:cNvPicPr>
+            <a:picLocks noChangeAspect="1"/>
+          </p:cNvPicPr>
+          <p:nvPr/>
+        </p:nvPicPr>
+        <p:blipFill>
+          <a:blip r:embed="rId20">
+            <a:extLst>
+              <a:ext uri="{28A0092B-C50C-407E-A947-70E740481C1C}">
+                <a14:useLocalDpi xmlns:a14="http://schemas.microsoft.com/office/drawing/2010/main" val="0"/>
+              </a:ext>
+            </a:extLst>
+          </a:blip>
+          <a:stretch>
+            <a:fillRect/>
+          </a:stretch>
+        </p:blipFill>
+        <p:spPr>
+          <a:xfrm>
+            <a:off x="23720338" y="26075077"/>
+            <a:ext cx="5129213" cy="4103370"/>
           </a:xfrm>
           <a:prstGeom prst="rect">
             <a:avLst/>

</xml_diff>